<commit_message>
Updates from ON & Brian
</commit_message>
<xml_diff>
--- a/presentations/sdc/2-SDC-Workflow.pptx
+++ b/presentations/sdc/2-SDC-Workflow.pptx
@@ -265,11 +265,16 @@
 </p188:authorLst>
 </file>
 
+<file path=ppt/commentAuthors.xml><?xml version="1.0" encoding="utf-8"?>
+<p:cmAuthorLst xmlns:a="http://schemas.openxmlformats.org/drawingml/2006/main" xmlns:r="http://schemas.openxmlformats.org/officeDocument/2006/relationships" xmlns:p="http://schemas.openxmlformats.org/presentationml/2006/main">
+  <p:cmAuthor id="1" name="Lloyd McKenzie" initials="" lastIdx="0" clrIdx="0"/>
+</p:cmAuthorLst>
+</file>
+
 <file path=ppt/revisionInfo.xml><?xml version="1.0" encoding="utf-8"?>
 <p1510:revInfo xmlns:a="http://schemas.openxmlformats.org/drawingml/2006/main" xmlns:r="http://schemas.openxmlformats.org/officeDocument/2006/relationships" xmlns:p1510="http://schemas.microsoft.com/office/powerpoint/2015/10/main">
   <p1510:revLst>
-    <p1510:client id="{4AE1BDEB-F457-C908-3396-B058E24B70BF}" v="50" dt="2025-02-07T18:23:59.405"/>
-    <p1510:client id="{581B8736-3125-A9AD-AA3C-6454078DAEFA}" v="8" dt="2025-02-06T19:52:46.089"/>
+    <p1510:client id="{A379FCE7-6227-4D72-96C8-EF6BFA70C99C}" v="23" dt="2025-02-26T20:12:06.662"/>
   </p1510:revLst>
 </p1510:revInfo>
 </file>
@@ -304,6 +309,111 @@
             <ac:picMk id="10" creationId="{4C67EB07-5B5A-ABBE-62DB-73A1075C3332}"/>
           </ac:picMkLst>
         </pc:picChg>
+      </pc:sldChg>
+    </pc:docChg>
+  </pc:docChgLst>
+  <pc:docChgLst>
+    <pc:chgData name="Smith, Travon" userId="S::travon.smith@ontariohealth.ca::7b3aeafc-2903-42e7-a83c-385da38dde87" providerId="AD" clId="Web-{A379FCE7-6227-4D72-96C8-EF6BFA70C99C}"/>
+    <pc:docChg chg="modSld">
+      <pc:chgData name="Smith, Travon" userId="S::travon.smith@ontariohealth.ca::7b3aeafc-2903-42e7-a83c-385da38dde87" providerId="AD" clId="Web-{A379FCE7-6227-4D72-96C8-EF6BFA70C99C}" dt="2025-02-26T20:12:06.146" v="19" actId="20577"/>
+      <pc:docMkLst>
+        <pc:docMk/>
+      </pc:docMkLst>
+      <pc:sldChg chg="modSp">
+        <pc:chgData name="Smith, Travon" userId="S::travon.smith@ontariohealth.ca::7b3aeafc-2903-42e7-a83c-385da38dde87" providerId="AD" clId="Web-{A379FCE7-6227-4D72-96C8-EF6BFA70C99C}" dt="2025-02-26T20:04:12.641" v="1" actId="20577"/>
+        <pc:sldMkLst>
+          <pc:docMk/>
+          <pc:sldMk cId="655917162" sldId="665"/>
+        </pc:sldMkLst>
+        <pc:spChg chg="mod">
+          <ac:chgData name="Smith, Travon" userId="S::travon.smith@ontariohealth.ca::7b3aeafc-2903-42e7-a83c-385da38dde87" providerId="AD" clId="Web-{A379FCE7-6227-4D72-96C8-EF6BFA70C99C}" dt="2025-02-26T20:04:12.641" v="1" actId="20577"/>
+          <ac:spMkLst>
+            <pc:docMk/>
+            <pc:sldMk cId="655917162" sldId="665"/>
+            <ac:spMk id="4" creationId="{00000000-0000-0000-0000-000000000000}"/>
+          </ac:spMkLst>
+        </pc:spChg>
+      </pc:sldChg>
+      <pc:sldChg chg="modSp">
+        <pc:chgData name="Smith, Travon" userId="S::travon.smith@ontariohealth.ca::7b3aeafc-2903-42e7-a83c-385da38dde87" providerId="AD" clId="Web-{A379FCE7-6227-4D72-96C8-EF6BFA70C99C}" dt="2025-02-26T20:05:13.376" v="8" actId="20577"/>
+        <pc:sldMkLst>
+          <pc:docMk/>
+          <pc:sldMk cId="4257480053" sldId="760"/>
+        </pc:sldMkLst>
+        <pc:spChg chg="mod">
+          <ac:chgData name="Smith, Travon" userId="S::travon.smith@ontariohealth.ca::7b3aeafc-2903-42e7-a83c-385da38dde87" providerId="AD" clId="Web-{A379FCE7-6227-4D72-96C8-EF6BFA70C99C}" dt="2025-02-26T20:05:13.376" v="8" actId="20577"/>
+          <ac:spMkLst>
+            <pc:docMk/>
+            <pc:sldMk cId="4257480053" sldId="760"/>
+            <ac:spMk id="6" creationId="{ABA82CCF-A761-28A0-BD52-91495FE7ECA0}"/>
+          </ac:spMkLst>
+        </pc:spChg>
+      </pc:sldChg>
+      <pc:sldChg chg="modSp modCm">
+        <pc:chgData name="Smith, Travon" userId="S::travon.smith@ontariohealth.ca::7b3aeafc-2903-42e7-a83c-385da38dde87" providerId="AD" clId="Web-{A379FCE7-6227-4D72-96C8-EF6BFA70C99C}" dt="2025-02-26T20:11:17.177" v="14" actId="20577"/>
+        <pc:sldMkLst>
+          <pc:docMk/>
+          <pc:sldMk cId="140907830" sldId="782"/>
+        </pc:sldMkLst>
+        <pc:spChg chg="mod">
+          <ac:chgData name="Smith, Travon" userId="S::travon.smith@ontariohealth.ca::7b3aeafc-2903-42e7-a83c-385da38dde87" providerId="AD" clId="Web-{A379FCE7-6227-4D72-96C8-EF6BFA70C99C}" dt="2025-02-26T20:11:09.505" v="11" actId="20577"/>
+          <ac:spMkLst>
+            <pc:docMk/>
+            <pc:sldMk cId="140907830" sldId="782"/>
+            <ac:spMk id="7" creationId="{80E61A94-138B-7226-B90E-4F63FD9F71B3}"/>
+          </ac:spMkLst>
+        </pc:spChg>
+        <pc:spChg chg="mod">
+          <ac:chgData name="Smith, Travon" userId="S::travon.smith@ontariohealth.ca::7b3aeafc-2903-42e7-a83c-385da38dde87" providerId="AD" clId="Web-{A379FCE7-6227-4D72-96C8-EF6BFA70C99C}" dt="2025-02-26T20:11:17.177" v="14" actId="20577"/>
+          <ac:spMkLst>
+            <pc:docMk/>
+            <pc:sldMk cId="140907830" sldId="782"/>
+            <ac:spMk id="9" creationId="{3164FD5F-CE8B-0207-E09B-473E18BF004A}"/>
+          </ac:spMkLst>
+        </pc:spChg>
+        <pc:extLst>
+          <p:ext xmlns:p="http://schemas.openxmlformats.org/presentationml/2006/main" uri="{D6D511B9-2390-475A-947B-AFAB55BFBCF1}">
+            <pc226:cmChg xmlns:pc226="http://schemas.microsoft.com/office/powerpoint/2022/06/main/command" chg="mod">
+              <pc226:chgData name="Smith, Travon" userId="S::travon.smith@ontariohealth.ca::7b3aeafc-2903-42e7-a83c-385da38dde87" providerId="AD" clId="Web-{A379FCE7-6227-4D72-96C8-EF6BFA70C99C}" dt="2025-02-26T20:11:14.130" v="13" actId="20577"/>
+              <pc2:cmMkLst xmlns:pc2="http://schemas.microsoft.com/office/powerpoint/2019/9/main/command">
+                <pc:docMk/>
+                <pc:sldMk cId="140907830" sldId="782"/>
+                <pc2:cmMk id="{949405F1-F442-4C3F-B4E8-5DDDB2D25614}"/>
+              </pc2:cmMkLst>
+            </pc226:cmChg>
+          </p:ext>
+        </pc:extLst>
+      </pc:sldChg>
+      <pc:sldChg chg="modSp">
+        <pc:chgData name="Smith, Travon" userId="S::travon.smith@ontariohealth.ca::7b3aeafc-2903-42e7-a83c-385da38dde87" providerId="AD" clId="Web-{A379FCE7-6227-4D72-96C8-EF6BFA70C99C}" dt="2025-02-26T20:12:06.146" v="19" actId="20577"/>
+        <pc:sldMkLst>
+          <pc:docMk/>
+          <pc:sldMk cId="3594980676" sldId="785"/>
+        </pc:sldMkLst>
+        <pc:spChg chg="mod">
+          <ac:chgData name="Smith, Travon" userId="S::travon.smith@ontariohealth.ca::7b3aeafc-2903-42e7-a83c-385da38dde87" providerId="AD" clId="Web-{A379FCE7-6227-4D72-96C8-EF6BFA70C99C}" dt="2025-02-26T20:12:06.146" v="19" actId="20577"/>
+          <ac:spMkLst>
+            <pc:docMk/>
+            <pc:sldMk cId="3594980676" sldId="785"/>
+            <ac:spMk id="9" creationId="{E2623BAB-A6C5-3C0F-9B3B-CCFC94A582A8}"/>
+          </ac:spMkLst>
+        </pc:spChg>
+      </pc:sldChg>
+    </pc:docChg>
+  </pc:docChgLst>
+  <pc:docChgLst>
+    <pc:chgData name="Sabljakovic, Sanjin" userId="S::sanjin.sabljakovic@ontariohealth.ca::184e10db-d9ef-4a6d-a899-68e589f56c5f" providerId="AD" clId="Web-{8DFB6E89-85BA-4AC6-B7EF-1BF7A3443A71}"/>
+    <pc:docChg chg="sldOrd">
+      <pc:chgData name="Sabljakovic, Sanjin" userId="S::sanjin.sabljakovic@ontariohealth.ca::184e10db-d9ef-4a6d-a899-68e589f56c5f" providerId="AD" clId="Web-{8DFB6E89-85BA-4AC6-B7EF-1BF7A3443A71}" dt="2025-02-18T17:51:24.856" v="0"/>
+      <pc:docMkLst>
+        <pc:docMk/>
+      </pc:docMkLst>
+      <pc:sldChg chg="ord">
+        <pc:chgData name="Sabljakovic, Sanjin" userId="S::sanjin.sabljakovic@ontariohealth.ca::184e10db-d9ef-4a6d-a899-68e589f56c5f" providerId="AD" clId="Web-{8DFB6E89-85BA-4AC6-B7EF-1BF7A3443A71}" dt="2025-02-18T17:51:24.856" v="0"/>
+        <pc:sldMkLst>
+          <pc:docMk/>
+          <pc:sldMk cId="3250045566" sldId="793"/>
+        </pc:sldMkLst>
       </pc:sldChg>
     </pc:docChg>
   </pc:docChgLst>
@@ -1217,46 +1327,6 @@
         <a:r>
           <a:rPr lang="en-CA"/>
           <a:t>Provide the source and editable diagram.</a:t>
-        </a:r>
-      </a:p>
-    </p188:txBody>
-  </p188:cm>
-</p188:cmLst>
-</file>
-
-<file path=ppt/comments/modernComment_30E_8661536.xml><?xml version="1.0" encoding="utf-8"?>
-<p188:cmLst xmlns:a="http://schemas.openxmlformats.org/drawingml/2006/main" xmlns:r="http://schemas.openxmlformats.org/officeDocument/2006/relationships" xmlns:p188="http://schemas.microsoft.com/office/powerpoint/2018/8/main">
-  <p188:cm id="{949405F1-F442-4C3F-B4E8-5DDDB2D25614}" authorId="{DB71EC90-ADB7-C55B-20D8-CD2F029B2E3C}" status="resolved" created="2025-02-04T21:52:09.713" complete="100000">
-    <ac:txMkLst xmlns:ac="http://schemas.microsoft.com/office/drawing/2013/main/command">
-      <pc:docMk xmlns:pc="http://schemas.microsoft.com/office/powerpoint/2013/main/command"/>
-      <pc:sldMk xmlns:pc="http://schemas.microsoft.com/office/powerpoint/2013/main/command" cId="140907830" sldId="782"/>
-      <ac:spMk id="9" creationId="{3164FD5F-CE8B-0207-E09B-473E18BF004A}"/>
-      <ac:txMk cp="171" len="62">
-        <ac:context len="234" hash="2012778223"/>
-      </ac:txMk>
-    </ac:txMkLst>
-    <p188:pos x="3124200" y="2849880"/>
-    <p188:replyLst>
-      <p188:reply id="{67E5CFEC-A853-4918-BDCA-A761A71EE366}" authorId="{A35F686D-0653-5C3C-ECC2-1EA5E9BC1567}" created="2025-02-07T16:05:23.548">
-        <p188:txBody>
-          <a:bodyPr/>
-          <a:lstStyle/>
-          <a:p>
-            <a:r>
-              <a:rPr lang="en-US"/>
-              <a:t>I'll do this as part of the narration.  The gist is that if you're capturing data electronically, the codes are already there in the QuestionnaireResponse, while if you have a paper form, you need to transcribe the data and select the codes.</a:t>
-            </a:r>
-          </a:p>
-        </p188:txBody>
-      </p188:reply>
-    </p188:replyLst>
-    <p188:txBody>
-      <a:bodyPr/>
-      <a:lstStyle/>
-      <a:p>
-        <a:r>
-          <a:rPr lang="en-US"/>
-          <a:t>Please explain how answers are automatically encoded.</a:t>
         </a:r>
       </a:p>
     </p188:txBody>
@@ -20895,7 +20965,7 @@
             <a:fld id="{1BCE7D1B-E2D6-42EC-A46F-6B8D8AB722EA}" type="datetime1">
               <a:rPr lang="en-US" altLang="en-US"/>
               <a:pPr/>
-              <a:t>2/24/2025</a:t>
+              <a:t>3/1/2025</a:t>
             </a:fld>
             <a:endParaRPr lang="en-US" altLang="en-US"/>
           </a:p>
@@ -21126,7 +21196,7 @@
             <a:fld id="{60D4D74E-7671-46E5-9A5B-14F31A4C0D2E}" type="datetime1">
               <a:rPr lang="en-US" altLang="en-US"/>
               <a:pPr/>
-              <a:t>2/24/2025</a:t>
+              <a:t>3/1/2025</a:t>
             </a:fld>
             <a:endParaRPr lang="en-US" altLang="en-US"/>
           </a:p>
@@ -21509,7 +21579,7 @@
           <a:p>
             <a:r>
               <a:rPr lang="en-US" dirty="0"/>
-              <a:t>Form creation requires expertise (and different kids of it)</a:t>
+              <a:t>Form creation requires expertise (and different kinds of it)</a:t>
             </a:r>
           </a:p>
           <a:p>
@@ -21710,31 +21780,34 @@
           <a:p>
             <a:r>
               <a:rPr lang="en-US" dirty="0"/>
-              <a:t>Searching for questionnaires</a:t>
+              <a:t>Searching</a:t>
             </a:r>
+            <a:r>
+              <a:rPr lang="en-US"/>
+              <a:t> for questionnaires</a:t>
+            </a:r>
+            <a:endParaRPr lang="en-US" dirty="0"/>
           </a:p>
           <a:p>
             <a:r>
-              <a:rPr lang="en-US" dirty="0"/>
+              <a:rPr lang="en-US"/>
               <a:t>Green = required search criteria</a:t>
             </a:r>
+            <a:endParaRPr lang="en-US" dirty="0"/>
           </a:p>
           <a:p>
             <a:r>
-              <a:rPr lang="en-US" dirty="0"/>
+              <a:rPr lang="en-US"/>
               <a:t>Orange = optional search criteria</a:t>
             </a:r>
+            <a:endParaRPr lang="en-US" dirty="0"/>
           </a:p>
           <a:p>
             <a:r>
-              <a:rPr lang="en-US" dirty="0" err="1"/>
-              <a:t>Xs</a:t>
+              <a:rPr lang="en-US"/>
+              <a:t>Xs = can’t search by these</a:t>
             </a:r>
-            <a:r>
-              <a:rPr lang="en-US" dirty="0"/>
-              <a:t> = can’t search by these</a:t>
-            </a:r>
-            <a:endParaRPr lang="en-CA" dirty="0"/>
+            <a:endParaRPr lang="en-CA"/>
           </a:p>
         </p:txBody>
       </p:sp>
@@ -21765,7 +21838,7 @@
     </p:spTree>
     <p:extLst>
       <p:ext uri="{BB962C8B-B14F-4D97-AF65-F5344CB8AC3E}">
-        <p14:creationId xmlns:p14="http://schemas.microsoft.com/office/powerpoint/2010/main" val="72404293"/>
+        <p14:creationId xmlns:p14="http://schemas.microsoft.com/office/powerpoint/2010/main" val="715307219"/>
       </p:ext>
     </p:extLst>
   </p:cSld>
@@ -32355,50 +32428,78 @@
           <a:lstStyle/>
           <a:p>
             <a:r>
-              <a:rPr lang="en-US" sz="2000"/>
+              <a:rPr lang="en-US" sz="2000" dirty="0">
+                <a:ea typeface="ヒラギノ角ゴ Pro W3"/>
+              </a:rPr>
               <a:t>FHIR Client</a:t>
             </a:r>
           </a:p>
           <a:p>
             <a:r>
-              <a:rPr lang="en-US" sz="2000"/>
+              <a:rPr lang="en-US" sz="2000" dirty="0">
+                <a:ea typeface="ヒラギノ角ゴ Pro W3"/>
+              </a:rPr>
               <a:t>Allows users to find, load, complete, edit, and store forms</a:t>
             </a:r>
           </a:p>
           <a:p>
             <a:r>
-              <a:rPr lang="en-US" sz="2000"/>
+              <a:rPr lang="en-US" sz="2000" dirty="0">
+                <a:ea typeface="ヒラギノ角ゴ Pro W3"/>
+              </a:rPr>
               <a:t>Needs to:</a:t>
             </a:r>
           </a:p>
           <a:p>
             <a:pPr lvl="1"/>
             <a:r>
-              <a:rPr lang="en-US" sz="1800"/>
-              <a:t>render questions and answers with proper controls</a:t>
+              <a:rPr lang="en-US" sz="1800">
+                <a:ea typeface="ヒラギノ角ゴ Pro W3"/>
+              </a:rPr>
+              <a:t>Render questions and answers with proper controls</a:t>
             </a:r>
           </a:p>
           <a:p>
             <a:pPr lvl="1"/>
             <a:r>
-              <a:rPr lang="en-US" sz="1800"/>
-              <a:t>determine allowed options</a:t>
+              <a:rPr lang="en-US" sz="1800">
+                <a:ea typeface="ヒラギノ角ゴ Pro W3"/>
+              </a:rPr>
+              <a:t>Determine </a:t>
+            </a:r>
+            <a:r>
+              <a:rPr lang="en-US" sz="1800" dirty="0">
+                <a:ea typeface="ヒラギノ角ゴ Pro W3"/>
+              </a:rPr>
+              <a:t>allowed options</a:t>
             </a:r>
           </a:p>
           <a:p>
             <a:pPr lvl="1"/>
             <a:r>
-              <a:rPr lang="en-US" sz="1800"/>
-              <a:t>enforce validation rules</a:t>
+              <a:rPr lang="en-US" sz="1800">
+                <a:ea typeface="ヒラギノ角ゴ Pro W3"/>
+              </a:rPr>
+              <a:t>Enforce validation rules</a:t>
             </a:r>
           </a:p>
           <a:p>
             <a:pPr lvl="1"/>
             <a:r>
-              <a:rPr lang="en-US" sz="1800"/>
-              <a:t>enforce flow control</a:t>
+              <a:rPr lang="en-US" sz="1800">
+                <a:ea typeface="ヒラギノ角ゴ Pro W3"/>
+              </a:rPr>
+              <a:t>Enforce </a:t>
             </a:r>
-            <a:endParaRPr lang="en-CA" sz="1800"/>
+            <a:r>
+              <a:rPr lang="en-US" sz="1800" dirty="0">
+                <a:ea typeface="ヒラギノ角ゴ Pro W3"/>
+              </a:rPr>
+              <a:t>flow control</a:t>
+            </a:r>
+            <a:endParaRPr lang="en-CA" sz="1800" dirty="0">
+              <a:ea typeface="ヒラギノ角ゴ Pro W3"/>
+            </a:endParaRPr>
           </a:p>
         </p:txBody>
       </p:sp>
@@ -33115,36 +33216,36 @@
           <a:lstStyle/>
           <a:p>
             <a:r>
-              <a:rPr lang="en-US" dirty="0"/>
+              <a:rPr lang="en-US"/>
               <a:t>FHIR Server</a:t>
             </a:r>
           </a:p>
           <a:p>
             <a:r>
-              <a:rPr lang="en-US" dirty="0"/>
+              <a:rPr lang="en-US"/>
               <a:t>Allows systems to search for, store, retrieve, and update Questionnaires</a:t>
             </a:r>
           </a:p>
           <a:p>
             <a:r>
+              <a:rPr lang="en-US"/>
+              <a:t>May also support associated ValueSets and CodeSystems</a:t>
+            </a:r>
+          </a:p>
+          <a:p>
+            <a:r>
               <a:rPr lang="en-US" dirty="0"/>
-              <a:t>May also support associated ValueSets and </a:t>
+              <a:t>Handles</a:t>
             </a:r>
             <a:r>
-              <a:rPr lang="en-US" dirty="0" err="1"/>
-              <a:t>CodeSystems</a:t>
+              <a:rPr lang="en-US"/>
+              <a:t> multiple versions of the above</a:t>
             </a:r>
             <a:endParaRPr lang="en-US" dirty="0"/>
           </a:p>
           <a:p>
             <a:r>
-              <a:rPr lang="en-US" dirty="0"/>
-              <a:t>Handles multiple versions of the above</a:t>
-            </a:r>
-          </a:p>
-          <a:p>
-            <a:r>
-              <a:rPr lang="en-US" dirty="0"/>
+              <a:rPr lang="en-US"/>
               <a:t>May support Questionnaire assembly</a:t>
             </a:r>
             <a:endParaRPr lang="en-CA" dirty="0"/>
@@ -36457,49 +36558,43 @@
           <a:lstStyle/>
           <a:p>
             <a:r>
-              <a:rPr lang="en-US" sz="2000" dirty="0"/>
+              <a:rPr lang="en-US"/>
               <a:t>What are the questions?</a:t>
             </a:r>
           </a:p>
           <a:p>
             <a:r>
-              <a:rPr lang="en-US" sz="2000" dirty="0"/>
+              <a:rPr lang="en-US"/>
               <a:t>What are the allowed answers?</a:t>
             </a:r>
           </a:p>
           <a:p>
             <a:r>
-              <a:rPr lang="en-US" sz="2000" dirty="0"/>
+              <a:rPr lang="en-US"/>
               <a:t>How are both phrased?</a:t>
             </a:r>
           </a:p>
           <a:p>
             <a:r>
-              <a:rPr lang="en-US" sz="2000" dirty="0"/>
+              <a:rPr lang="en-US"/>
               <a:t>What does the form look like?</a:t>
             </a:r>
           </a:p>
           <a:p>
             <a:r>
-              <a:rPr lang="en-US" sz="2000" dirty="0"/>
-              <a:t>Are there dynamic behaviors?</a:t>
-            </a:r>
-          </a:p>
-          <a:p>
-            <a:r>
-              <a:rPr lang="en-US" sz="2000" dirty="0"/>
+              <a:rPr lang="en-US"/>
               <a:t>What are the validation rules?</a:t>
             </a:r>
           </a:p>
           <a:p>
             <a:r>
-              <a:rPr lang="en-US" sz="2000" dirty="0"/>
+              <a:rPr lang="en-US"/>
               <a:t>What are the flow rules?</a:t>
             </a:r>
           </a:p>
           <a:p>
             <a:r>
-              <a:rPr lang="en-US" sz="2000" dirty="0"/>
+              <a:rPr lang="en-US"/>
               <a:t>What are the mappings to underlying data elements?</a:t>
             </a:r>
           </a:p>
@@ -36733,47 +36828,60 @@
           <a:lstStyle/>
           <a:p>
             <a:r>
-              <a:rPr lang="en-US"/>
+              <a:rPr lang="en-US" dirty="0">
+                <a:ea typeface="ヒラギノ角ゴ Pro W3"/>
+              </a:rPr>
               <a:t># of questions is limited</a:t>
             </a:r>
           </a:p>
           <a:p>
             <a:r>
-              <a:rPr lang="en-US"/>
+              <a:rPr lang="en-US" dirty="0">
+                <a:ea typeface="ヒラギノ角ゴ Pro W3"/>
+              </a:rPr>
               <a:t>Answers are limited</a:t>
             </a:r>
           </a:p>
           <a:p>
-            <a:endParaRPr lang="en-US"/>
-          </a:p>
-          <a:p>
             <a:r>
-              <a:rPr lang="en-US"/>
+              <a:rPr lang="en-US" dirty="0">
+                <a:ea typeface="ヒラギノ角ゴ Pro W3"/>
+              </a:rPr>
               <a:t>Rules explained by text</a:t>
             </a:r>
           </a:p>
           <a:p>
             <a:r>
-              <a:rPr lang="en-US"/>
+              <a:rPr lang="en-US" dirty="0">
+                <a:ea typeface="ヒラギノ角ゴ Pro W3"/>
+              </a:rPr>
               <a:t>Calculations are manual</a:t>
             </a:r>
           </a:p>
           <a:p>
             <a:r>
-              <a:rPr lang="en-US"/>
+              <a:rPr lang="en-US" dirty="0">
+                <a:ea typeface="ヒラギノ角ゴ Pro W3"/>
+              </a:rPr>
               <a:t>References by identifiers &amp; demographics</a:t>
             </a:r>
           </a:p>
           <a:p>
             <a:r>
-              <a:rPr lang="en-US"/>
+              <a:rPr lang="en-US" dirty="0">
+                <a:ea typeface="ヒラギノ角ゴ Pro W3"/>
+              </a:rPr>
               <a:t>Answers must be transcribed</a:t>
             </a:r>
             <a:r>
-              <a:rPr lang="en-CA"/>
+              <a:rPr lang="en-CA" dirty="0">
+                <a:ea typeface="ヒラギノ角ゴ Pro W3"/>
+              </a:rPr>
               <a:t> &amp; coded</a:t>
             </a:r>
-            <a:endParaRPr lang="en-US"/>
+            <a:endParaRPr lang="en-US" dirty="0">
+              <a:ea typeface="ヒラギノ角ゴ Pro W3"/>
+            </a:endParaRPr>
           </a:p>
           <a:p>
             <a:endParaRPr lang="en-US"/>
@@ -36831,47 +36939,58 @@
           <a:lstStyle/>
           <a:p>
             <a:r>
-              <a:rPr lang="en-US"/>
+              <a:rPr lang="en-US" dirty="0">
+                <a:ea typeface="ヒラギノ角ゴ Pro W3"/>
+              </a:rPr>
               <a:t># of potential questions unlimited</a:t>
             </a:r>
           </a:p>
           <a:p>
             <a:r>
-              <a:rPr lang="en-US"/>
+              <a:rPr lang="en-US" dirty="0">
+                <a:ea typeface="ヒラギノ角ゴ Pro W3"/>
+              </a:rPr>
               <a:t>Answers can be dynamic</a:t>
             </a:r>
           </a:p>
           <a:p>
             <a:pPr lvl="1"/>
             <a:r>
-              <a:rPr lang="en-US"/>
+              <a:rPr lang="en-US" dirty="0">
+                <a:ea typeface="ヒラギノ角ゴ Pro W3"/>
+              </a:rPr>
               <a:t>Also type-ahead dropdowns</a:t>
             </a:r>
           </a:p>
           <a:p>
             <a:r>
-              <a:rPr lang="en-US"/>
+              <a:rPr lang="en-US" dirty="0">
+                <a:ea typeface="ヒラギノ角ゴ Pro W3"/>
+              </a:rPr>
               <a:t>Rules enforced automatically</a:t>
             </a:r>
           </a:p>
           <a:p>
             <a:r>
-              <a:rPr lang="en-US"/>
+              <a:rPr lang="en-US" dirty="0">
+                <a:ea typeface="ヒラギノ角ゴ Pro W3"/>
+              </a:rPr>
               <a:t>Calculations are automatic</a:t>
             </a:r>
           </a:p>
           <a:p>
             <a:r>
-              <a:rPr lang="en-US"/>
+              <a:rPr lang="en-US" dirty="0">
+                <a:ea typeface="ヒラギノ角ゴ Pro W3"/>
+              </a:rPr>
               <a:t>References as true references</a:t>
             </a:r>
           </a:p>
           <a:p>
-            <a:endParaRPr lang="en-US"/>
-          </a:p>
-          <a:p>
             <a:r>
-              <a:rPr lang="en-US"/>
+              <a:rPr lang="en-US" dirty="0">
+                <a:ea typeface="ヒラギノ角ゴ Pro W3"/>
+              </a:rPr>
               <a:t>Answers are automatically encoded and available electronically</a:t>
             </a:r>
           </a:p>
@@ -36887,11 +37006,6 @@
   <p:clrMapOvr>
     <a:masterClrMapping/>
   </p:clrMapOvr>
-  <p:extLst>
-    <p:ext uri="{6950BFC3-D8DA-4A85-94F7-54DA5524770B}">
-      <p188:commentRel xmlns:p188="http://schemas.microsoft.com/office/powerpoint/2018/8/main" r:id="rId3"/>
-    </p:ext>
-  </p:extLst>
 </p:sld>
 </file>
 
@@ -36934,10 +37048,10 @@
           <a:lstStyle/>
           <a:p>
             <a:r>
-              <a:rPr lang="en-US" dirty="0"/>
+              <a:rPr lang="en-US"/>
               <a:t>Where do forms live?</a:t>
             </a:r>
-            <a:endParaRPr lang="en-CA" dirty="0"/>
+            <a:endParaRPr lang="en-CA"/>
           </a:p>
         </p:txBody>
       </p:sp>
@@ -38132,47 +38246,57 @@
           <a:lstStyle/>
           <a:p>
             <a:r>
-              <a:rPr lang="en-US"/>
+              <a:rPr lang="en-US" dirty="0">
+                <a:ea typeface="ヒラギノ角ゴ Pro W3"/>
+              </a:rPr>
               <a:t>Not an order</a:t>
             </a:r>
           </a:p>
           <a:p>
             <a:r>
-              <a:rPr lang="en-US"/>
+              <a:rPr lang="en-US" dirty="0">
+                <a:ea typeface="ヒラギノ角ゴ Pro W3"/>
+              </a:rPr>
               <a:t>Initiates fulfillment on its own</a:t>
             </a:r>
           </a:p>
           <a:p>
-            <a:endParaRPr lang="en-US" sz="1200"/>
+            <a:r>
+              <a:rPr lang="en-US" dirty="0">
+                <a:ea typeface="ヒラギノ角ゴ Pro W3"/>
+              </a:rPr>
+              <a:t>Uses </a:t>
+            </a:r>
+            <a:r>
+              <a:rPr lang="en-US" dirty="0" err="1">
+                <a:ea typeface="ヒラギノ角ゴ Pro W3"/>
+              </a:rPr>
+              <a:t>Task.input</a:t>
+            </a:r>
+            <a:endParaRPr lang="en-US" dirty="0" err="1"/>
           </a:p>
           <a:p>
             <a:r>
-              <a:rPr lang="en-US"/>
-              <a:t>Uses </a:t>
+              <a:rPr lang="en-CA" dirty="0">
+                <a:ea typeface="ヒラギノ角ゴ Pro W3"/>
+              </a:rPr>
+              <a:t>QR links to Task as </a:t>
             </a:r>
             <a:r>
-              <a:rPr lang="en-US" err="1"/>
-              <a:t>Task.input</a:t>
+              <a:rPr lang="en-CA" dirty="0" err="1">
+                <a:ea typeface="ヒラギノ角ゴ Pro W3"/>
+              </a:rPr>
+              <a:t>Task.output</a:t>
             </a:r>
-            <a:endParaRPr lang="en-US"/>
-          </a:p>
-          <a:p>
-            <a:endParaRPr lang="en-US" sz="1200"/>
+            <a:endParaRPr lang="en-CA" dirty="0">
+              <a:ea typeface="ヒラギノ角ゴ Pro W3"/>
+            </a:endParaRPr>
           </a:p>
           <a:p>
             <a:r>
-              <a:rPr lang="en-CA"/>
-              <a:t>QR links to Task as </a:t>
-            </a:r>
-            <a:r>
-              <a:rPr lang="en-CA" err="1"/>
-              <a:t>Task.output</a:t>
-            </a:r>
-            <a:endParaRPr lang="en-CA"/>
-          </a:p>
-          <a:p>
-            <a:r>
-              <a:rPr lang="en-CA"/>
+              <a:rPr lang="en-CA" dirty="0">
+                <a:ea typeface="ヒラギノ角ゴ Pro W3"/>
+              </a:rPr>
               <a:t>Can only seek one occurrence</a:t>
             </a:r>
           </a:p>
@@ -40697,21 +40821,31 @@
             <a:pPr lvl="1"/>
             <a:r>
               <a:rPr lang="en-CA" sz="1800" dirty="0"/>
-              <a:t>$extract</a:t>
+              <a:t>$</a:t>
             </a:r>
+            <a:r>
+              <a:rPr lang="en-CA" sz="1800"/>
+              <a:t>extract</a:t>
+            </a:r>
+            <a:endParaRPr lang="en-CA" sz="1800" dirty="0"/>
           </a:p>
           <a:p>
             <a:pPr lvl="1"/>
             <a:r>
-              <a:rPr lang="en-CA" sz="1800" dirty="0"/>
+              <a:rPr lang="en-CA" sz="1800"/>
               <a:t>$assemble</a:t>
             </a:r>
+            <a:endParaRPr lang="en-CA" sz="1800" dirty="0"/>
           </a:p>
           <a:p>
             <a:pPr lvl="1"/>
             <a:r>
+              <a:rPr lang="en-CA" sz="1800"/>
+              <a:t>terminology </a:t>
+            </a:r>
+            <a:r>
               <a:rPr lang="en-CA" sz="1800" dirty="0"/>
-              <a:t>terminology functionality</a:t>
+              <a:t>functionality</a:t>
             </a:r>
           </a:p>
           <a:p>
@@ -45370,6 +45504,21 @@
 </file>
 
 <file path=customXml/item1.xml><?xml version="1.0" encoding="utf-8"?>
+<p:properties xmlns:p="http://schemas.microsoft.com/office/2006/metadata/properties" xmlns:xsi="http://www.w3.org/2001/XMLSchema-instance" xmlns:pc="http://schemas.microsoft.com/office/infopath/2007/PartnerControls">
+  <documentManagement/>
+</p:properties>
+</file>
+
+<file path=customXml/item2.xml><?xml version="1.0" encoding="utf-8"?>
+<?mso-contentType ?>
+<FormTemplates xmlns="http://schemas.microsoft.com/sharepoint/v3/contenttype/forms">
+  <Display>DocumentLibraryForm</Display>
+  <Edit>DocumentLibraryForm</Edit>
+  <New>DocumentLibraryForm</New>
+</FormTemplates>
+</file>
+
+<file path=customXml/item3.xml><?xml version="1.0" encoding="utf-8"?>
 <ct:contentTypeSchema xmlns:ct="http://schemas.microsoft.com/office/2006/metadata/contentType" xmlns:ma="http://schemas.microsoft.com/office/2006/metadata/properties/metaAttributes" ct:_="" ma:_="" ma:contentTypeName="Document" ma:contentTypeID="0x01010046B6A228CEBB844FBC6B8633F16E3300" ma:contentTypeVersion="4" ma:contentTypeDescription="Create a new document." ma:contentTypeScope="" ma:versionID="5b56d2be9ea1ecaf21ca08678214dcd0">
   <xsd:schema xmlns:xsd="http://www.w3.org/2001/XMLSchema" xmlns:xs="http://www.w3.org/2001/XMLSchema" xmlns:p="http://schemas.microsoft.com/office/2006/metadata/properties" xmlns:ns2="2371556d-c2f8-4c27-a7c5-4c2acf225d27" targetNamespace="http://schemas.microsoft.com/office/2006/metadata/properties" ma:root="true" ma:fieldsID="e32f1ed78c00c18b31e32be9b8f4ba9c" ns2:_="">
     <xsd:import namespace="2371556d-c2f8-4c27-a7c5-4c2acf225d27"/>
@@ -45513,22 +45662,31 @@
 </ct:contentTypeSchema>
 </file>
 
-<file path=customXml/item2.xml><?xml version="1.0" encoding="utf-8"?>
-<p:properties xmlns:p="http://schemas.microsoft.com/office/2006/metadata/properties" xmlns:xsi="http://www.w3.org/2001/XMLSchema-instance" xmlns:pc="http://schemas.microsoft.com/office/infopath/2007/PartnerControls">
-  <documentManagement/>
-</p:properties>
+<file path=customXml/itemProps1.xml><?xml version="1.0" encoding="utf-8"?>
+<ds:datastoreItem xmlns:ds="http://schemas.openxmlformats.org/officeDocument/2006/customXml" ds:itemID="{5DA54D51-2B6B-4782-B08A-37EA255910DC}">
+  <ds:schemaRefs>
+    <ds:schemaRef ds:uri="2371556d-c2f8-4c27-a7c5-4c2acf225d27"/>
+    <ds:schemaRef ds:uri="http://purl.org/dc/dcmitype/"/>
+    <ds:schemaRef ds:uri="http://purl.org/dc/elements/1.1/"/>
+    <ds:schemaRef ds:uri="http://purl.org/dc/terms/"/>
+    <ds:schemaRef ds:uri="http://schemas.microsoft.com/office/2006/documentManagement/types"/>
+    <ds:schemaRef ds:uri="http://schemas.microsoft.com/office/2006/metadata/properties"/>
+    <ds:schemaRef ds:uri="http://schemas.microsoft.com/office/infopath/2007/PartnerControls"/>
+    <ds:schemaRef ds:uri="http://schemas.openxmlformats.org/package/2006/metadata/core-properties"/>
+    <ds:schemaRef ds:uri="http://www.w3.org/XML/1998/namespace"/>
+  </ds:schemaRefs>
+</ds:datastoreItem>
 </file>
 
-<file path=customXml/item3.xml><?xml version="1.0" encoding="utf-8"?>
-<?mso-contentType ?>
-<FormTemplates xmlns="http://schemas.microsoft.com/sharepoint/v3/contenttype/forms">
-  <Display>DocumentLibraryForm</Display>
-  <Edit>DocumentLibraryForm</Edit>
-  <New>DocumentLibraryForm</New>
-</FormTemplates>
+<file path=customXml/itemProps2.xml><?xml version="1.0" encoding="utf-8"?>
+<ds:datastoreItem xmlns:ds="http://schemas.openxmlformats.org/officeDocument/2006/customXml" ds:itemID="{CDDF200F-A0B4-4E9C-9B04-A027B0669895}">
+  <ds:schemaRefs>
+    <ds:schemaRef ds:uri="http://schemas.microsoft.com/sharepoint/v3/contenttype/forms"/>
+  </ds:schemaRefs>
+</ds:datastoreItem>
 </file>
 
-<file path=customXml/itemProps1.xml><?xml version="1.0" encoding="utf-8"?>
+<file path=customXml/itemProps3.xml><?xml version="1.0" encoding="utf-8"?>
 <ds:datastoreItem xmlns:ds="http://schemas.openxmlformats.org/officeDocument/2006/customXml" ds:itemID="{4944224C-55E5-4DF8-AA81-1F1DD2CB03F9}">
   <ds:schemaRefs>
     <ds:schemaRef ds:uri="2371556d-c2f8-4c27-a7c5-4c2acf225d27"/>
@@ -45544,28 +45702,4 @@
     <ds:schemaRef ds:uri="http://www.w3.org/2001/XMLSchema"/>
   </ds:schemaRefs>
 </ds:datastoreItem>
-</file>
-
-<file path=customXml/itemProps2.xml><?xml version="1.0" encoding="utf-8"?>
-<ds:datastoreItem xmlns:ds="http://schemas.openxmlformats.org/officeDocument/2006/customXml" ds:itemID="{5DA54D51-2B6B-4782-B08A-37EA255910DC}">
-  <ds:schemaRefs>
-    <ds:schemaRef ds:uri="2371556d-c2f8-4c27-a7c5-4c2acf225d27"/>
-    <ds:schemaRef ds:uri="http://purl.org/dc/dcmitype/"/>
-    <ds:schemaRef ds:uri="http://purl.org/dc/elements/1.1/"/>
-    <ds:schemaRef ds:uri="http://purl.org/dc/terms/"/>
-    <ds:schemaRef ds:uri="http://schemas.microsoft.com/office/2006/documentManagement/types"/>
-    <ds:schemaRef ds:uri="http://schemas.microsoft.com/office/2006/metadata/properties"/>
-    <ds:schemaRef ds:uri="http://schemas.microsoft.com/office/infopath/2007/PartnerControls"/>
-    <ds:schemaRef ds:uri="http://schemas.openxmlformats.org/package/2006/metadata/core-properties"/>
-    <ds:schemaRef ds:uri="http://www.w3.org/XML/1998/namespace"/>
-  </ds:schemaRefs>
-</ds:datastoreItem>
-</file>
-
-<file path=customXml/itemProps3.xml><?xml version="1.0" encoding="utf-8"?>
-<ds:datastoreItem xmlns:ds="http://schemas.openxmlformats.org/officeDocument/2006/customXml" ds:itemID="{CDDF200F-A0B4-4E9C-9B04-A027B0669895}">
-  <ds:schemaRefs>
-    <ds:schemaRef ds:uri="http://schemas.microsoft.com/sharepoint/v3/contenttype/forms"/>
-  </ds:schemaRefs>
-</ds:datastoreItem>
 </file>
</xml_diff>

<commit_message>
Final presentations, plus examples
</commit_message>
<xml_diff>
--- a/presentations/sdc/2-SDC-Workflow.pptx
+++ b/presentations/sdc/2-SDC-Workflow.pptx
@@ -48,9 +48,9 @@
     <p:sldId id="791" r:id="rId39"/>
     <p:sldId id="790" r:id="rId40"/>
     <p:sldId id="796" r:id="rId41"/>
-    <p:sldId id="789" r:id="rId42"/>
-    <p:sldId id="777" r:id="rId43"/>
-    <p:sldId id="783" r:id="rId44"/>
+    <p:sldId id="777" r:id="rId42"/>
+    <p:sldId id="783" r:id="rId43"/>
+    <p:sldId id="801" r:id="rId44"/>
     <p:sldId id="800" r:id="rId45"/>
   </p:sldIdLst>
   <p:sldSz cx="9144000" cy="5143500" type="screen16x9"/>
@@ -183,13 +183,9 @@
   <p:extLst>
     <p:ext uri="{521415D9-36F7-43E2-AB2F-B90AF26B5E84}">
       <p14:sectionLst xmlns:p14="http://schemas.microsoft.com/office/powerpoint/2010/main">
-        <p14:section name="Default Section" id="{FCEF45CB-6358-424E-B568-EE528EA4F780}">
+        <p14:section name="Workflow Introduction" id="{FCEF45CB-6358-424E-B568-EE528EA4F780}">
           <p14:sldIdLst>
             <p14:sldId id="798"/>
-          </p14:sldIdLst>
-        </p14:section>
-        <p14:section name="Workflow Introduction" id="{D38FF39E-B259-48C0-843F-0ABC302CB28B}">
-          <p14:sldIdLst>
             <p14:sldId id="690"/>
             <p14:sldId id="799"/>
             <p14:sldId id="680"/>
@@ -241,10 +237,14 @@
             <p14:sldId id="773"/>
             <p14:sldId id="791"/>
             <p14:sldId id="790"/>
+          </p14:sldIdLst>
+        </p14:section>
+        <p14:section name="Exercieses" id="{DF606C65-B72C-48F9-A939-8B7F1630702B}">
+          <p14:sldIdLst>
             <p14:sldId id="796"/>
-            <p14:sldId id="789"/>
             <p14:sldId id="777"/>
             <p14:sldId id="783"/>
+            <p14:sldId id="801"/>
             <p14:sldId id="800"/>
           </p14:sldIdLst>
         </p14:section>
@@ -6295,10 +6295,10 @@
         <a:lstStyle/>
         <a:p>
           <a:r>
-            <a:rPr lang="en-US"/>
+            <a:rPr lang="en-US" b="1"/>
             <a:t>SDC System Roles</a:t>
           </a:r>
-          <a:endParaRPr lang="en-CA"/>
+          <a:endParaRPr lang="en-CA" b="1"/>
         </a:p>
       </dgm:t>
     </dgm:pt>
@@ -6752,10 +6752,10 @@
         <a:lstStyle/>
         <a:p>
           <a:r>
-            <a:rPr lang="en-US"/>
+            <a:rPr lang="en-US" b="1"/>
             <a:t>Form Creation Workflow</a:t>
           </a:r>
-          <a:endParaRPr lang="en-CA"/>
+          <a:endParaRPr lang="en-CA" b="1"/>
         </a:p>
       </dgm:t>
     </dgm:pt>
@@ -7209,10 +7209,10 @@
         <a:lstStyle/>
         <a:p>
           <a:r>
-            <a:rPr lang="en-US"/>
+            <a:rPr lang="en-US" b="1"/>
             <a:t>Form Fulfillment Workflow</a:t>
           </a:r>
-          <a:endParaRPr lang="en-CA"/>
+          <a:endParaRPr lang="en-CA" b="1"/>
         </a:p>
       </dgm:t>
     </dgm:pt>
@@ -7666,10 +7666,10 @@
         <a:lstStyle/>
         <a:p>
           <a:r>
-            <a:rPr lang="en-US"/>
+            <a:rPr lang="en-US" b="1"/>
             <a:t>Form Rendering Workflow</a:t>
           </a:r>
-          <a:endParaRPr lang="en-CA"/>
+          <a:endParaRPr lang="en-CA" b="1"/>
         </a:p>
       </dgm:t>
     </dgm:pt>
@@ -7697,7 +7697,13 @@
     </dgm:pt>
     <dgm:pt modelId="{F7804CF8-A785-466F-9482-3D191ABFD207}">
       <dgm:prSet phldrT="[Text]"/>
-      <dgm:spPr/>
+      <dgm:spPr>
+        <a:ln>
+          <a:solidFill>
+            <a:srgbClr val="6591C5"/>
+          </a:solidFill>
+        </a:ln>
+      </dgm:spPr>
       <dgm:t>
         <a:bodyPr/>
         <a:lstStyle/>
@@ -8109,17 +8115,21 @@
     <dgm:pt modelId="{F7804CF8-A785-466F-9482-3D191ABFD207}">
       <dgm:prSet phldrT="[Text]"/>
       <dgm:spPr>
-        <a:ln w="57150"/>
+        <a:ln w="57150">
+          <a:solidFill>
+            <a:srgbClr val="6591C5"/>
+          </a:solidFill>
+        </a:ln>
       </dgm:spPr>
       <dgm:t>
         <a:bodyPr/>
         <a:lstStyle/>
         <a:p>
           <a:r>
-            <a:rPr lang="en-US"/>
+            <a:rPr lang="en-US" b="1"/>
             <a:t>Workflow Exercises</a:t>
           </a:r>
-          <a:endParaRPr lang="en-CA"/>
+          <a:endParaRPr lang="en-CA" b="1"/>
         </a:p>
       </dgm:t>
     </dgm:pt>
@@ -9265,10 +9275,10 @@
             <a:buNone/>
           </a:pPr>
           <a:r>
-            <a:rPr lang="en-US" sz="1800" kern="1200"/>
+            <a:rPr lang="en-US" sz="1800" b="1" kern="1200"/>
             <a:t>SDC System Roles</a:t>
           </a:r>
-          <a:endParaRPr lang="en-CA" sz="1800" kern="1200"/>
+          <a:endParaRPr lang="en-CA" sz="1800" b="1" kern="1200"/>
         </a:p>
       </dsp:txBody>
       <dsp:txXfrm>
@@ -10169,10 +10179,10 @@
             <a:buNone/>
           </a:pPr>
           <a:r>
-            <a:rPr lang="en-US" sz="1800" kern="1200"/>
+            <a:rPr lang="en-US" sz="1800" b="1" kern="1200"/>
             <a:t>Form Creation Workflow</a:t>
           </a:r>
-          <a:endParaRPr lang="en-CA" sz="1800" kern="1200"/>
+          <a:endParaRPr lang="en-CA" sz="1800" b="1" kern="1200"/>
         </a:p>
       </dsp:txBody>
       <dsp:txXfrm>
@@ -11073,10 +11083,10 @@
             <a:buNone/>
           </a:pPr>
           <a:r>
-            <a:rPr lang="en-US" sz="1800" kern="1200"/>
+            <a:rPr lang="en-US" sz="1800" b="1" kern="1200"/>
             <a:t>Form Fulfillment Workflow</a:t>
           </a:r>
-          <a:endParaRPr lang="en-CA" sz="1800" kern="1200"/>
+          <a:endParaRPr lang="en-CA" sz="1800" b="1" kern="1200"/>
         </a:p>
       </dsp:txBody>
       <dsp:txXfrm>
@@ -11977,10 +11987,10 @@
             <a:buNone/>
           </a:pPr>
           <a:r>
-            <a:rPr lang="en-US" sz="1800" kern="1200"/>
+            <a:rPr lang="en-US" sz="1800" b="1" kern="1200"/>
             <a:t>Form Rendering Workflow</a:t>
           </a:r>
-          <a:endParaRPr lang="en-CA" sz="1800" kern="1200"/>
+          <a:endParaRPr lang="en-CA" sz="1800" b="1" kern="1200"/>
         </a:p>
       </dsp:txBody>
       <dsp:txXfrm>
@@ -12072,12 +12082,7 @@
         </a:solidFill>
         <a:ln w="25400" cap="flat" cmpd="sng" algn="ctr">
           <a:solidFill>
-            <a:schemeClr val="accent1">
-              <a:hueOff val="0"/>
-              <a:satOff val="0"/>
-              <a:lumOff val="0"/>
-              <a:alphaOff val="0"/>
-            </a:schemeClr>
+            <a:srgbClr val="6591C5"/>
           </a:solidFill>
           <a:prstDash val="solid"/>
         </a:ln>
@@ -12841,7 +12846,7 @@
         </a:solidFill>
         <a:ln w="57150" cap="flat" cmpd="sng" algn="ctr">
           <a:solidFill>
-            <a:scrgbClr r="0" g="0" b="0"/>
+            <a:srgbClr val="6591C5"/>
           </a:solidFill>
           <a:prstDash val="solid"/>
         </a:ln>
@@ -12878,10 +12883,10 @@
             <a:buNone/>
           </a:pPr>
           <a:r>
-            <a:rPr lang="en-US" sz="1800" kern="1200"/>
+            <a:rPr lang="en-US" sz="1800" b="1" kern="1200"/>
             <a:t>Workflow Exercises</a:t>
           </a:r>
-          <a:endParaRPr lang="en-CA" sz="1800" kern="1200"/>
+          <a:endParaRPr lang="en-CA" sz="1800" b="1" kern="1200"/>
         </a:p>
       </dsp:txBody>
       <dsp:txXfrm>
@@ -20965,7 +20970,7 @@
             <a:fld id="{1BCE7D1B-E2D6-42EC-A46F-6B8D8AB722EA}" type="datetime1">
               <a:rPr lang="en-US" altLang="en-US"/>
               <a:pPr/>
-              <a:t>3/1/2025</a:t>
+              <a:t>3/3/2025</a:t>
             </a:fld>
             <a:endParaRPr lang="en-US" altLang="en-US"/>
           </a:p>
@@ -21196,7 +21201,7 @@
             <a:fld id="{60D4D74E-7671-46E5-9A5B-14F31A4C0D2E}" type="datetime1">
               <a:rPr lang="en-US" altLang="en-US"/>
               <a:pPr/>
-              <a:t>3/1/2025</a:t>
+              <a:t>3/3/2025</a:t>
             </a:fld>
             <a:endParaRPr lang="en-US" altLang="en-US"/>
           </a:p>
@@ -36462,7 +36467,7 @@
           <p:nvPr>
             <p:extLst>
               <p:ext uri="{D42A27DB-BD31-4B8C-83A1-F6EECF244321}">
-                <p14:modId xmlns:p14="http://schemas.microsoft.com/office/powerpoint/2010/main" val="398304928"/>
+                <p14:modId xmlns:p14="http://schemas.microsoft.com/office/powerpoint/2010/main" val="1627288961"/>
               </p:ext>
             </p:extLst>
           </p:nvPr>
@@ -37418,7 +37423,7 @@
           <p:nvPr>
             <p:extLst>
               <p:ext uri="{D42A27DB-BD31-4B8C-83A1-F6EECF244321}">
-                <p14:modId xmlns:p14="http://schemas.microsoft.com/office/powerpoint/2010/main" val="2466892161"/>
+                <p14:modId xmlns:p14="http://schemas.microsoft.com/office/powerpoint/2010/main" val="3816455661"/>
               </p:ext>
             </p:extLst>
           </p:nvPr>
@@ -38769,7 +38774,7 @@
               <a:rPr lang="en-US" dirty="0">
                 <a:ea typeface="ヒラギノ角ゴ Pro W3"/>
               </a:rPr>
-              <a:t>(Do with it as you wish, so long as you give credit</a:t>
+              <a:t>Do with it as you wish, so long as you give credit</a:t>
             </a:r>
           </a:p>
         </p:txBody>
@@ -38990,7 +38995,7 @@
           <p:nvPr>
             <p:extLst>
               <p:ext uri="{D42A27DB-BD31-4B8C-83A1-F6EECF244321}">
-                <p14:modId xmlns:p14="http://schemas.microsoft.com/office/powerpoint/2010/main" val="259445603"/>
+                <p14:modId xmlns:p14="http://schemas.microsoft.com/office/powerpoint/2010/main" val="1935350938"/>
               </p:ext>
             </p:extLst>
           </p:nvPr>
@@ -41215,7 +41220,7 @@
           <p:nvPr>
             <p:extLst>
               <p:ext uri="{D42A27DB-BD31-4B8C-83A1-F6EECF244321}">
-                <p14:modId xmlns:p14="http://schemas.microsoft.com/office/powerpoint/2010/main" val="837597782"/>
+                <p14:modId xmlns:p14="http://schemas.microsoft.com/office/powerpoint/2010/main" val="4236274850"/>
               </p:ext>
             </p:extLst>
           </p:nvPr>
@@ -41244,137 +41249,6 @@
 </file>
 
 <file path=ppt/slides/slide38.xml><?xml version="1.0" encoding="utf-8"?>
-<p:sld xmlns:a="http://schemas.openxmlformats.org/drawingml/2006/main" xmlns:r="http://schemas.openxmlformats.org/officeDocument/2006/relationships" xmlns:p="http://schemas.openxmlformats.org/presentationml/2006/main">
-  <p:cSld>
-    <p:spTree>
-      <p:nvGrpSpPr>
-        <p:cNvPr id="1" name="">
-          <a:extLst>
-            <a:ext uri="{FF2B5EF4-FFF2-40B4-BE49-F238E27FC236}">
-              <a16:creationId xmlns:a16="http://schemas.microsoft.com/office/drawing/2014/main" id="{946E2D39-97D4-289C-6D31-B26AE391D7D3}"/>
-            </a:ext>
-          </a:extLst>
-        </p:cNvPr>
-        <p:cNvGrpSpPr/>
-        <p:nvPr/>
-      </p:nvGrpSpPr>
-      <p:grpSpPr>
-        <a:xfrm>
-          <a:off x="0" y="0"/>
-          <a:ext cx="0" cy="0"/>
-          <a:chOff x="0" y="0"/>
-          <a:chExt cx="0" cy="0"/>
-        </a:xfrm>
-      </p:grpSpPr>
-      <p:sp>
-        <p:nvSpPr>
-          <p:cNvPr id="6" name="Title 5">
-            <a:extLst>
-              <a:ext uri="{FF2B5EF4-FFF2-40B4-BE49-F238E27FC236}">
-                <a16:creationId xmlns:a16="http://schemas.microsoft.com/office/drawing/2014/main" id="{811D172C-EA45-753B-80B6-208884C6BA7A}"/>
-              </a:ext>
-            </a:extLst>
-          </p:cNvPr>
-          <p:cNvSpPr>
-            <a:spLocks noGrp="1"/>
-          </p:cNvSpPr>
-          <p:nvPr>
-            <p:ph type="title"/>
-          </p:nvPr>
-        </p:nvSpPr>
-        <p:spPr/>
-        <p:txBody>
-          <a:bodyPr/>
-          <a:lstStyle/>
-          <a:p>
-            <a:r>
-              <a:rPr lang="en-CA"/>
-              <a:t>SDC Workflow Exercises</a:t>
-            </a:r>
-          </a:p>
-        </p:txBody>
-      </p:sp>
-      <p:sp>
-        <p:nvSpPr>
-          <p:cNvPr id="4" name="Footer Placeholder 3">
-            <a:extLst>
-              <a:ext uri="{FF2B5EF4-FFF2-40B4-BE49-F238E27FC236}">
-                <a16:creationId xmlns:a16="http://schemas.microsoft.com/office/drawing/2014/main" id="{716C780E-4261-2F8F-5A81-20269A9049F8}"/>
-              </a:ext>
-            </a:extLst>
-          </p:cNvPr>
-          <p:cNvSpPr>
-            <a:spLocks noGrp="1"/>
-          </p:cNvSpPr>
-          <p:nvPr>
-            <p:ph type="ftr" sz="quarter" idx="10"/>
-          </p:nvPr>
-        </p:nvSpPr>
-        <p:spPr/>
-        <p:txBody>
-          <a:bodyPr/>
-          <a:lstStyle/>
-          <a:p>
-            <a:r>
-              <a:rPr lang="en-CA" b="1"/>
-              <a:t>© 2025 Health Level Seven ® International. All Rights Reserved. Published under the Creative Commons 3.0 Attribution </a:t>
-            </a:r>
-            <a:r>
-              <a:rPr lang="en-CA" b="1" err="1"/>
-              <a:t>Unported</a:t>
-            </a:r>
-            <a:r>
-              <a:rPr lang="en-CA" b="1"/>
-              <a:t> license</a:t>
-            </a:r>
-            <a:endParaRPr lang="en-US" b="1"/>
-          </a:p>
-        </p:txBody>
-      </p:sp>
-      <p:sp>
-        <p:nvSpPr>
-          <p:cNvPr id="5" name="Slide Number Placeholder 4">
-            <a:extLst>
-              <a:ext uri="{FF2B5EF4-FFF2-40B4-BE49-F238E27FC236}">
-                <a16:creationId xmlns:a16="http://schemas.microsoft.com/office/drawing/2014/main" id="{53CF4D1A-A00A-82BA-0C6F-91FAD41D8545}"/>
-              </a:ext>
-            </a:extLst>
-          </p:cNvPr>
-          <p:cNvSpPr>
-            <a:spLocks noGrp="1"/>
-          </p:cNvSpPr>
-          <p:nvPr>
-            <p:ph type="sldNum" sz="quarter" idx="11"/>
-          </p:nvPr>
-        </p:nvSpPr>
-        <p:spPr/>
-        <p:txBody>
-          <a:bodyPr/>
-          <a:lstStyle/>
-          <a:p>
-            <a:fld id="{6CACE926-AEF5-4BFE-8BD7-24414108CB7B}" type="slidenum">
-              <a:rPr lang="en-US" altLang="en-US" smtClean="0"/>
-              <a:pPr/>
-              <a:t>38</a:t>
-            </a:fld>
-            <a:endParaRPr lang="en-US" altLang="en-US"/>
-          </a:p>
-        </p:txBody>
-      </p:sp>
-    </p:spTree>
-    <p:extLst>
-      <p:ext uri="{BB962C8B-B14F-4D97-AF65-F5344CB8AC3E}">
-        <p14:creationId xmlns:p14="http://schemas.microsoft.com/office/powerpoint/2010/main" val="3267680492"/>
-      </p:ext>
-    </p:extLst>
-  </p:cSld>
-  <p:clrMapOvr>
-    <a:masterClrMapping/>
-  </p:clrMapOvr>
-</p:sld>
-</file>
-
-<file path=ppt/slides/slide39.xml><?xml version="1.0" encoding="utf-8"?>
 <p:sld xmlns:a="http://schemas.openxmlformats.org/drawingml/2006/main" xmlns:r="http://schemas.openxmlformats.org/officeDocument/2006/relationships" xmlns:p="http://schemas.openxmlformats.org/presentationml/2006/main">
   <p:cSld>
     <p:spTree>
@@ -41552,6 +41426,209 @@
             <a:fld id="{6CACE926-AEF5-4BFE-8BD7-24414108CB7B}" type="slidenum">
               <a:rPr lang="en-US" altLang="en-US" smtClean="0"/>
               <a:pPr/>
+              <a:t>38</a:t>
+            </a:fld>
+            <a:endParaRPr lang="en-US" altLang="en-US"/>
+          </a:p>
+        </p:txBody>
+      </p:sp>
+    </p:spTree>
+    <p:extLst>
+      <p:ext uri="{BB962C8B-B14F-4D97-AF65-F5344CB8AC3E}">
+        <p14:creationId xmlns:p14="http://schemas.microsoft.com/office/powerpoint/2010/main" val="1206330453"/>
+      </p:ext>
+    </p:extLst>
+  </p:cSld>
+  <p:clrMapOvr>
+    <a:masterClrMapping/>
+  </p:clrMapOvr>
+</p:sld>
+</file>
+
+<file path=ppt/slides/slide39.xml><?xml version="1.0" encoding="utf-8"?>
+<p:sld xmlns:a="http://schemas.openxmlformats.org/drawingml/2006/main" xmlns:r="http://schemas.openxmlformats.org/officeDocument/2006/relationships" xmlns:p="http://schemas.openxmlformats.org/presentationml/2006/main">
+  <p:cSld>
+    <p:spTree>
+      <p:nvGrpSpPr>
+        <p:cNvPr id="1" name="">
+          <a:extLst>
+            <a:ext uri="{FF2B5EF4-FFF2-40B4-BE49-F238E27FC236}">
+              <a16:creationId xmlns:a16="http://schemas.microsoft.com/office/drawing/2014/main" id="{64594ADC-01C1-30AB-57F6-70E24796A15A}"/>
+            </a:ext>
+          </a:extLst>
+        </p:cNvPr>
+        <p:cNvGrpSpPr/>
+        <p:nvPr/>
+      </p:nvGrpSpPr>
+      <p:grpSpPr>
+        <a:xfrm>
+          <a:off x="0" y="0"/>
+          <a:ext cx="0" cy="0"/>
+          <a:chOff x="0" y="0"/>
+          <a:chExt cx="0" cy="0"/>
+        </a:xfrm>
+      </p:grpSpPr>
+      <p:sp>
+        <p:nvSpPr>
+          <p:cNvPr id="4" name="Title 3">
+            <a:extLst>
+              <a:ext uri="{FF2B5EF4-FFF2-40B4-BE49-F238E27FC236}">
+                <a16:creationId xmlns:a16="http://schemas.microsoft.com/office/drawing/2014/main" id="{DE37136B-E346-578C-610E-9D9F2D2A2428}"/>
+              </a:ext>
+            </a:extLst>
+          </p:cNvPr>
+          <p:cNvSpPr>
+            <a:spLocks noGrp="1"/>
+          </p:cNvSpPr>
+          <p:nvPr>
+            <p:ph type="title"/>
+          </p:nvPr>
+        </p:nvSpPr>
+        <p:spPr/>
+        <p:txBody>
+          <a:bodyPr/>
+          <a:lstStyle/>
+          <a:p>
+            <a:r>
+              <a:rPr lang="en-US"/>
+              <a:t>Answers</a:t>
+            </a:r>
+            <a:endParaRPr lang="en-CA"/>
+          </a:p>
+        </p:txBody>
+      </p:sp>
+      <p:sp>
+        <p:nvSpPr>
+          <p:cNvPr id="5" name="Text Placeholder 4">
+            <a:extLst>
+              <a:ext uri="{FF2B5EF4-FFF2-40B4-BE49-F238E27FC236}">
+                <a16:creationId xmlns:a16="http://schemas.microsoft.com/office/drawing/2014/main" id="{A0DAE472-CFC4-43CD-9995-EC9C580D42BC}"/>
+              </a:ext>
+            </a:extLst>
+          </p:cNvPr>
+          <p:cNvSpPr>
+            <a:spLocks noGrp="1"/>
+          </p:cNvSpPr>
+          <p:nvPr>
+            <p:ph type="body" sz="quarter" idx="13"/>
+          </p:nvPr>
+        </p:nvSpPr>
+        <p:spPr/>
+        <p:txBody>
+          <a:bodyPr/>
+          <a:lstStyle/>
+          <a:p>
+            <a:pPr marL="457200" indent="-457200">
+              <a:buFont typeface="+mj-lt"/>
+              <a:buAutoNum type="arabicPeriod"/>
+            </a:pPr>
+            <a:r>
+              <a:rPr lang="en-US" sz="2000"/>
+              <a:t>Form Filler</a:t>
+            </a:r>
+          </a:p>
+          <a:p>
+            <a:pPr marL="457200" indent="-457200">
+              <a:buFont typeface="+mj-lt"/>
+              <a:buAutoNum type="arabicPeriod"/>
+            </a:pPr>
+            <a:r>
+              <a:rPr lang="en-US" sz="2000"/>
+              <a:t>Questionnaire, ValueSet, CodeSystem</a:t>
+            </a:r>
+          </a:p>
+          <a:p>
+            <a:pPr marL="457200" indent="-457200">
+              <a:buFont typeface="+mj-lt"/>
+              <a:buAutoNum type="arabicPeriod"/>
+            </a:pPr>
+            <a:r>
+              <a:rPr lang="en-US" sz="2000"/>
+              <a:t>Definition, Event</a:t>
+            </a:r>
+          </a:p>
+          <a:p>
+            <a:pPr marL="457200" indent="-457200">
+              <a:buFont typeface="+mj-lt"/>
+              <a:buAutoNum type="arabicPeriod"/>
+            </a:pPr>
+            <a:r>
+              <a:rPr lang="en-US" sz="2000"/>
+              <a:t>ServiceRequest, Task</a:t>
+            </a:r>
+          </a:p>
+          <a:p>
+            <a:pPr marL="457200" indent="-457200">
+              <a:buFont typeface="+mj-lt"/>
+              <a:buAutoNum type="arabicPeriod"/>
+            </a:pPr>
+            <a:r>
+              <a:rPr lang="en-US" sz="2000"/>
+              <a:t>1 - $process-form</a:t>
+            </a:r>
+          </a:p>
+          <a:p>
+            <a:pPr marL="457200" indent="-457200">
+              <a:buFont typeface="+mj-lt"/>
+              <a:buAutoNum type="arabicPeriod"/>
+            </a:pPr>
+            <a:endParaRPr lang="en-CA" sz="2000"/>
+          </a:p>
+        </p:txBody>
+      </p:sp>
+      <p:sp>
+        <p:nvSpPr>
+          <p:cNvPr id="2" name="Footer Placeholder 1">
+            <a:extLst>
+              <a:ext uri="{FF2B5EF4-FFF2-40B4-BE49-F238E27FC236}">
+                <a16:creationId xmlns:a16="http://schemas.microsoft.com/office/drawing/2014/main" id="{07A5943B-8BCE-4B68-E881-B27BD16DAE0B}"/>
+              </a:ext>
+            </a:extLst>
+          </p:cNvPr>
+          <p:cNvSpPr>
+            <a:spLocks noGrp="1"/>
+          </p:cNvSpPr>
+          <p:nvPr>
+            <p:ph type="ftr" sz="quarter" idx="10"/>
+          </p:nvPr>
+        </p:nvSpPr>
+        <p:spPr/>
+        <p:txBody>
+          <a:bodyPr/>
+          <a:lstStyle/>
+          <a:p>
+            <a:r>
+              <a:rPr lang="en-CA" b="1"/>
+              <a:t>© 2025 Health Level Seven ® International. All Rights Reserved. Published under the Creative Commons 3.0 Attribution Unported license</a:t>
+            </a:r>
+            <a:endParaRPr lang="en-US" b="1"/>
+          </a:p>
+        </p:txBody>
+      </p:sp>
+      <p:sp>
+        <p:nvSpPr>
+          <p:cNvPr id="3" name="Slide Number Placeholder 2">
+            <a:extLst>
+              <a:ext uri="{FF2B5EF4-FFF2-40B4-BE49-F238E27FC236}">
+                <a16:creationId xmlns:a16="http://schemas.microsoft.com/office/drawing/2014/main" id="{1B40FF59-E192-F1A7-BBBF-CC0B09315EA4}"/>
+              </a:ext>
+            </a:extLst>
+          </p:cNvPr>
+          <p:cNvSpPr>
+            <a:spLocks noGrp="1"/>
+          </p:cNvSpPr>
+          <p:nvPr>
+            <p:ph type="sldNum" sz="quarter" idx="11"/>
+          </p:nvPr>
+        </p:nvSpPr>
+        <p:spPr/>
+        <p:txBody>
+          <a:bodyPr/>
+          <a:lstStyle/>
+          <a:p>
+            <a:fld id="{6CACE926-AEF5-4BFE-8BD7-24414108CB7B}" type="slidenum">
+              <a:rPr lang="en-US" altLang="en-US" smtClean="0"/>
+              <a:pPr/>
               <a:t>39</a:t>
             </a:fld>
             <a:endParaRPr lang="en-US" altLang="en-US"/>
@@ -41561,7 +41638,7 @@
     </p:spTree>
     <p:extLst>
       <p:ext uri="{BB962C8B-B14F-4D97-AF65-F5344CB8AC3E}">
-        <p14:creationId xmlns:p14="http://schemas.microsoft.com/office/powerpoint/2010/main" val="1206330453"/>
+        <p14:creationId xmlns:p14="http://schemas.microsoft.com/office/powerpoint/2010/main" val="431558225"/>
       </p:ext>
     </p:extLst>
   </p:cSld>
@@ -41777,7 +41854,7 @@
         <p:cNvPr id="1" name="">
           <a:extLst>
             <a:ext uri="{FF2B5EF4-FFF2-40B4-BE49-F238E27FC236}">
-              <a16:creationId xmlns:a16="http://schemas.microsoft.com/office/drawing/2014/main" id="{64594ADC-01C1-30AB-57F6-70E24796A15A}"/>
+              <a16:creationId xmlns:a16="http://schemas.microsoft.com/office/drawing/2014/main" id="{5C405F10-1C82-270C-D90C-39A087061FA8}"/>
             </a:ext>
           </a:extLst>
         </p:cNvPr>
@@ -41794,10 +41871,10 @@
       </p:grpSpPr>
       <p:sp>
         <p:nvSpPr>
-          <p:cNvPr id="4" name="Title 3">
+          <p:cNvPr id="2" name="Title 1">
             <a:extLst>
               <a:ext uri="{FF2B5EF4-FFF2-40B4-BE49-F238E27FC236}">
-                <a16:creationId xmlns:a16="http://schemas.microsoft.com/office/drawing/2014/main" id="{DE37136B-E346-578C-610E-9D9F2D2A2428}"/>
+                <a16:creationId xmlns:a16="http://schemas.microsoft.com/office/drawing/2014/main" id="{A44C88DA-192B-DDF1-1BAB-4AEFAABBD195}"/>
               </a:ext>
             </a:extLst>
           </p:cNvPr>
@@ -41815,7 +41892,7 @@
           <a:p>
             <a:r>
               <a:rPr lang="en-US"/>
-              <a:t>Answers</a:t>
+              <a:t>The SDC Collection</a:t>
             </a:r>
             <a:endParaRPr lang="en-CA"/>
           </a:p>
@@ -41823,10 +41900,10 @@
       </p:sp>
       <p:sp>
         <p:nvSpPr>
-          <p:cNvPr id="5" name="Text Placeholder 4">
+          <p:cNvPr id="3" name="Text Placeholder 2">
             <a:extLst>
               <a:ext uri="{FF2B5EF4-FFF2-40B4-BE49-F238E27FC236}">
-                <a16:creationId xmlns:a16="http://schemas.microsoft.com/office/drawing/2014/main" id="{A0DAE472-CFC4-43CD-9995-EC9C580D42BC}"/>
+                <a16:creationId xmlns:a16="http://schemas.microsoft.com/office/drawing/2014/main" id="{26D8089E-99BA-3006-241D-9F9ECF344DDD}"/>
               </a:ext>
             </a:extLst>
           </p:cNvPr>
@@ -41842,70 +41919,66 @@
           <a:bodyPr/>
           <a:lstStyle/>
           <a:p>
-            <a:pPr marL="457200" indent="-457200">
-              <a:buFont typeface="+mj-lt"/>
-              <a:buAutoNum type="arabicPeriod"/>
-            </a:pPr>
             <a:r>
-              <a:rPr lang="en-US" sz="2000"/>
-              <a:t>Form Filler</a:t>
+              <a:rPr lang="en-US" sz="1800"/>
+              <a:t>SDC Overview</a:t>
             </a:r>
           </a:p>
           <a:p>
-            <a:pPr marL="457200" indent="-457200">
-              <a:buFont typeface="+mj-lt"/>
-              <a:buAutoNum type="arabicPeriod"/>
-            </a:pPr>
             <a:r>
-              <a:rPr lang="en-US" sz="2000"/>
-              <a:t>Questionnaire, ValueSet, CodeSystem</a:t>
+              <a:rPr lang="en-US" sz="1800" b="1"/>
+              <a:t>SDC Workflow </a:t>
+            </a:r>
+            <a:r>
+              <a:rPr lang="en-US" sz="1800"/>
+              <a:t>(you are here)</a:t>
+            </a:r>
+            <a:endParaRPr lang="en-US" sz="1800" b="1"/>
+          </a:p>
+          <a:p>
+            <a:r>
+              <a:rPr lang="en-US" sz="1800"/>
+              <a:t>SDC Expressions</a:t>
             </a:r>
           </a:p>
           <a:p>
-            <a:pPr marL="457200" indent="-457200">
-              <a:buFont typeface="+mj-lt"/>
-              <a:buAutoNum type="arabicPeriod"/>
-            </a:pPr>
             <a:r>
-              <a:rPr lang="en-US" sz="2000"/>
-              <a:t>Definition, Event</a:t>
+              <a:rPr lang="en-US" sz="1800"/>
+              <a:t>SDC Rendering &amp; Behavior</a:t>
             </a:r>
           </a:p>
           <a:p>
-            <a:pPr marL="457200" indent="-457200">
-              <a:buFont typeface="+mj-lt"/>
-              <a:buAutoNum type="arabicPeriod"/>
-            </a:pPr>
             <a:r>
-              <a:rPr lang="en-US" sz="2000"/>
-              <a:t>ServiceRequest, Task</a:t>
+              <a:rPr lang="en-US" sz="1800"/>
+              <a:t>SDC Population</a:t>
             </a:r>
           </a:p>
           <a:p>
-            <a:pPr marL="457200" indent="-457200">
-              <a:buFont typeface="+mj-lt"/>
-              <a:buAutoNum type="arabicPeriod"/>
-            </a:pPr>
             <a:r>
-              <a:rPr lang="en-US" sz="2000"/>
-              <a:t>1 - $process-form</a:t>
+              <a:rPr lang="en-US" sz="1800"/>
+              <a:t>SDC Extraction</a:t>
             </a:r>
           </a:p>
           <a:p>
-            <a:pPr marL="457200" indent="-457200">
-              <a:buFont typeface="+mj-lt"/>
-              <a:buAutoNum type="arabicPeriod"/>
-            </a:pPr>
-            <a:endParaRPr lang="en-CA" sz="2000"/>
+            <a:r>
+              <a:rPr lang="en-US" sz="1800"/>
+              <a:t>SDC Adaptive Forms</a:t>
+            </a:r>
+          </a:p>
+          <a:p>
+            <a:r>
+              <a:rPr lang="en-US" sz="1800"/>
+              <a:t>SDC Modular &amp; Derived Forms</a:t>
+            </a:r>
           </a:p>
         </p:txBody>
       </p:sp>
       <p:sp>
         <p:nvSpPr>
-          <p:cNvPr id="2" name="Footer Placeholder 1">
+          <p:cNvPr id="4" name="Footer Placeholder 3">
             <a:extLst>
               <a:ext uri="{FF2B5EF4-FFF2-40B4-BE49-F238E27FC236}">
-                <a16:creationId xmlns:a16="http://schemas.microsoft.com/office/drawing/2014/main" id="{07A5943B-8BCE-4B68-E881-B27BD16DAE0B}"/>
+                <a16:creationId xmlns:a16="http://schemas.microsoft.com/office/drawing/2014/main" id="{CCDE27F9-E041-148C-B84B-373C5FC8EF44}"/>
               </a:ext>
             </a:extLst>
           </p:cNvPr>
@@ -41931,10 +42004,10 @@
       </p:sp>
       <p:sp>
         <p:nvSpPr>
-          <p:cNvPr id="3" name="Slide Number Placeholder 2">
+          <p:cNvPr id="5" name="Slide Number Placeholder 4">
             <a:extLst>
               <a:ext uri="{FF2B5EF4-FFF2-40B4-BE49-F238E27FC236}">
-                <a16:creationId xmlns:a16="http://schemas.microsoft.com/office/drawing/2014/main" id="{1B40FF59-E192-F1A7-BBBF-CC0B09315EA4}"/>
+                <a16:creationId xmlns:a16="http://schemas.microsoft.com/office/drawing/2014/main" id="{346C36FA-5DBE-CD13-0207-E3BCA55B3502}"/>
               </a:ext>
             </a:extLst>
           </p:cNvPr>
@@ -41959,10 +42032,46 @@
           </a:p>
         </p:txBody>
       </p:sp>
+      <p:pic>
+        <p:nvPicPr>
+          <p:cNvPr id="6" name="Picture 5" descr="A clipboard with a pen on it&#10;&#10;Description automatically generated">
+            <a:extLst>
+              <a:ext uri="{FF2B5EF4-FFF2-40B4-BE49-F238E27FC236}">
+                <a16:creationId xmlns:a16="http://schemas.microsoft.com/office/drawing/2014/main" id="{1528D502-DFA7-9302-70B6-589A157E392C}"/>
+              </a:ext>
+            </a:extLst>
+          </p:cNvPr>
+          <p:cNvPicPr>
+            <a:picLocks noChangeAspect="1"/>
+          </p:cNvPicPr>
+          <p:nvPr/>
+        </p:nvPicPr>
+        <p:blipFill>
+          <a:blip r:embed="rId2">
+            <a:extLst>
+              <a:ext uri="{837473B0-CC2E-450A-ABE3-18F120FF3D39}">
+                <a1611:picAttrSrcUrl xmlns:a1611="http://schemas.microsoft.com/office/drawing/2016/11/main" r:id="rId3"/>
+              </a:ext>
+            </a:extLst>
+          </a:blip>
+          <a:stretch>
+            <a:fillRect/>
+          </a:stretch>
+        </p:blipFill>
+        <p:spPr>
+          <a:xfrm>
+            <a:off x="6365671" y="1454442"/>
+            <a:ext cx="1714500" cy="1714500"/>
+          </a:xfrm>
+          <a:prstGeom prst="rect">
+            <a:avLst/>
+          </a:prstGeom>
+        </p:spPr>
+      </p:pic>
     </p:spTree>
     <p:extLst>
       <p:ext uri="{BB962C8B-B14F-4D97-AF65-F5344CB8AC3E}">
-        <p14:creationId xmlns:p14="http://schemas.microsoft.com/office/powerpoint/2010/main" val="431558225"/>
+        <p14:creationId xmlns:p14="http://schemas.microsoft.com/office/powerpoint/2010/main" val="2475329035"/>
       </p:ext>
     </p:extLst>
   </p:cSld>
@@ -42858,7 +42967,7 @@
           <p:nvPr>
             <p:extLst>
               <p:ext uri="{D42A27DB-BD31-4B8C-83A1-F6EECF244321}">
-                <p14:modId xmlns:p14="http://schemas.microsoft.com/office/powerpoint/2010/main" val="2875570069"/>
+                <p14:modId xmlns:p14="http://schemas.microsoft.com/office/powerpoint/2010/main" val="3691721925"/>
               </p:ext>
             </p:extLst>
           </p:nvPr>
@@ -45504,21 +45613,6 @@
 </file>
 
 <file path=customXml/item1.xml><?xml version="1.0" encoding="utf-8"?>
-<p:properties xmlns:p="http://schemas.microsoft.com/office/2006/metadata/properties" xmlns:xsi="http://www.w3.org/2001/XMLSchema-instance" xmlns:pc="http://schemas.microsoft.com/office/infopath/2007/PartnerControls">
-  <documentManagement/>
-</p:properties>
-</file>
-
-<file path=customXml/item2.xml><?xml version="1.0" encoding="utf-8"?>
-<?mso-contentType ?>
-<FormTemplates xmlns="http://schemas.microsoft.com/sharepoint/v3/contenttype/forms">
-  <Display>DocumentLibraryForm</Display>
-  <Edit>DocumentLibraryForm</Edit>
-  <New>DocumentLibraryForm</New>
-</FormTemplates>
-</file>
-
-<file path=customXml/item3.xml><?xml version="1.0" encoding="utf-8"?>
 <ct:contentTypeSchema xmlns:ct="http://schemas.microsoft.com/office/2006/metadata/contentType" xmlns:ma="http://schemas.microsoft.com/office/2006/metadata/properties/metaAttributes" ct:_="" ma:_="" ma:contentTypeName="Document" ma:contentTypeID="0x01010046B6A228CEBB844FBC6B8633F16E3300" ma:contentTypeVersion="4" ma:contentTypeDescription="Create a new document." ma:contentTypeScope="" ma:versionID="5b56d2be9ea1ecaf21ca08678214dcd0">
   <xsd:schema xmlns:xsd="http://www.w3.org/2001/XMLSchema" xmlns:xs="http://www.w3.org/2001/XMLSchema" xmlns:p="http://schemas.microsoft.com/office/2006/metadata/properties" xmlns:ns2="2371556d-c2f8-4c27-a7c5-4c2acf225d27" targetNamespace="http://schemas.microsoft.com/office/2006/metadata/properties" ma:root="true" ma:fieldsID="e32f1ed78c00c18b31e32be9b8f4ba9c" ns2:_="">
     <xsd:import namespace="2371556d-c2f8-4c27-a7c5-4c2acf225d27"/>
@@ -45662,7 +45756,40 @@
 </ct:contentTypeSchema>
 </file>
 
+<file path=customXml/item2.xml><?xml version="1.0" encoding="utf-8"?>
+<p:properties xmlns:p="http://schemas.microsoft.com/office/2006/metadata/properties" xmlns:xsi="http://www.w3.org/2001/XMLSchema-instance" xmlns:pc="http://schemas.microsoft.com/office/infopath/2007/PartnerControls">
+  <documentManagement/>
+</p:properties>
+</file>
+
+<file path=customXml/item3.xml><?xml version="1.0" encoding="utf-8"?>
+<?mso-contentType ?>
+<FormTemplates xmlns="http://schemas.microsoft.com/sharepoint/v3/contenttype/forms">
+  <Display>DocumentLibraryForm</Display>
+  <Edit>DocumentLibraryForm</Edit>
+  <New>DocumentLibraryForm</New>
+</FormTemplates>
+</file>
+
 <file path=customXml/itemProps1.xml><?xml version="1.0" encoding="utf-8"?>
+<ds:datastoreItem xmlns:ds="http://schemas.openxmlformats.org/officeDocument/2006/customXml" ds:itemID="{4944224C-55E5-4DF8-AA81-1F1DD2CB03F9}">
+  <ds:schemaRefs>
+    <ds:schemaRef ds:uri="2371556d-c2f8-4c27-a7c5-4c2acf225d27"/>
+    <ds:schemaRef ds:uri="http://purl.org/dc/elements/1.1/"/>
+    <ds:schemaRef ds:uri="http://purl.org/dc/terms/"/>
+    <ds:schemaRef ds:uri="http://schemas.microsoft.com/internal/obd"/>
+    <ds:schemaRef ds:uri="http://schemas.microsoft.com/office/2006/documentManagement/types"/>
+    <ds:schemaRef ds:uri="http://schemas.microsoft.com/office/2006/metadata/contentType"/>
+    <ds:schemaRef ds:uri="http://schemas.microsoft.com/office/2006/metadata/properties"/>
+    <ds:schemaRef ds:uri="http://schemas.microsoft.com/office/2006/metadata/properties/metaAttributes"/>
+    <ds:schemaRef ds:uri="http://schemas.microsoft.com/office/infopath/2007/PartnerControls"/>
+    <ds:schemaRef ds:uri="http://schemas.openxmlformats.org/package/2006/metadata/core-properties"/>
+    <ds:schemaRef ds:uri="http://www.w3.org/2001/XMLSchema"/>
+  </ds:schemaRefs>
+</ds:datastoreItem>
+</file>
+
+<file path=customXml/itemProps2.xml><?xml version="1.0" encoding="utf-8"?>
 <ds:datastoreItem xmlns:ds="http://schemas.openxmlformats.org/officeDocument/2006/customXml" ds:itemID="{5DA54D51-2B6B-4782-B08A-37EA255910DC}">
   <ds:schemaRefs>
     <ds:schemaRef ds:uri="2371556d-c2f8-4c27-a7c5-4c2acf225d27"/>
@@ -45678,28 +45805,10 @@
 </ds:datastoreItem>
 </file>
 
-<file path=customXml/itemProps2.xml><?xml version="1.0" encoding="utf-8"?>
+<file path=customXml/itemProps3.xml><?xml version="1.0" encoding="utf-8"?>
 <ds:datastoreItem xmlns:ds="http://schemas.openxmlformats.org/officeDocument/2006/customXml" ds:itemID="{CDDF200F-A0B4-4E9C-9B04-A027B0669895}">
   <ds:schemaRefs>
     <ds:schemaRef ds:uri="http://schemas.microsoft.com/sharepoint/v3/contenttype/forms"/>
   </ds:schemaRefs>
 </ds:datastoreItem>
-</file>
-
-<file path=customXml/itemProps3.xml><?xml version="1.0" encoding="utf-8"?>
-<ds:datastoreItem xmlns:ds="http://schemas.openxmlformats.org/officeDocument/2006/customXml" ds:itemID="{4944224C-55E5-4DF8-AA81-1F1DD2CB03F9}">
-  <ds:schemaRefs>
-    <ds:schemaRef ds:uri="2371556d-c2f8-4c27-a7c5-4c2acf225d27"/>
-    <ds:schemaRef ds:uri="http://purl.org/dc/elements/1.1/"/>
-    <ds:schemaRef ds:uri="http://purl.org/dc/terms/"/>
-    <ds:schemaRef ds:uri="http://schemas.microsoft.com/internal/obd"/>
-    <ds:schemaRef ds:uri="http://schemas.microsoft.com/office/2006/documentManagement/types"/>
-    <ds:schemaRef ds:uri="http://schemas.microsoft.com/office/2006/metadata/contentType"/>
-    <ds:schemaRef ds:uri="http://schemas.microsoft.com/office/2006/metadata/properties"/>
-    <ds:schemaRef ds:uri="http://schemas.microsoft.com/office/2006/metadata/properties/metaAttributes"/>
-    <ds:schemaRef ds:uri="http://schemas.microsoft.com/office/infopath/2007/PartnerControls"/>
-    <ds:schemaRef ds:uri="http://schemas.openxmlformats.org/package/2006/metadata/core-properties"/>
-    <ds:schemaRef ds:uri="http://www.w3.org/2001/XMLSchema"/>
-  </ds:schemaRefs>
-</ds:datastoreItem>
 </file>
</xml_diff>